<commit_message>
Resolved remaining editorial comments
</commit_message>
<xml_diff>
--- a/src/main/uml/doc/ANF Reference Model.pptx
+++ b/src/main/uml/doc/ANF Reference Model.pptx
@@ -271,7 +271,7 @@
           <a:p>
             <a:fld id="{AD676DAC-E5AA-4AEA-9200-196682C1EB3D}" type="datetimeFigureOut">
               <a:rPr lang="en-US" smtClean="0"/>
-              <a:t>8/8/2019</a:t>
+              <a:t>11/19/2019</a:t>
             </a:fld>
             <a:endParaRPr lang="en-US"/>
           </a:p>
@@ -448,7 +448,7 @@
           <a:p>
             <a:fld id="{440FB706-3D14-4F98-8C5D-05C6738AC3A2}" type="datetimeFigureOut">
               <a:rPr lang="en-US" smtClean="0"/>
-              <a:t>8/8/2019</a:t>
+              <a:t>11/19/2019</a:t>
             </a:fld>
             <a:endParaRPr lang="en-US"/>
           </a:p>
@@ -863,7 +863,7 @@
             <a:fld id="{B61BEF0D-F0BB-DE4B-95CE-6DB70DBA9567}" type="datetimeFigureOut">
               <a:rPr lang="en-US" smtClean="0"/>
               <a:pPr/>
-              <a:t>8/8/2019</a:t>
+              <a:t>11/19/2019</a:t>
             </a:fld>
             <a:endParaRPr lang="en-US" dirty="0"/>
           </a:p>
@@ -1063,7 +1063,7 @@
           <a:p>
             <a:fld id="{55C6B4A9-1611-4792-9094-5F34BCA07E0B}" type="datetimeFigureOut">
               <a:rPr lang="en-US" smtClean="0"/>
-              <a:t>8/8/2019</a:t>
+              <a:t>11/19/2019</a:t>
             </a:fld>
             <a:endParaRPr lang="en-US" dirty="0"/>
           </a:p>
@@ -1274,7 +1274,7 @@
             <a:fld id="{B61BEF0D-F0BB-DE4B-95CE-6DB70DBA9567}" type="datetimeFigureOut">
               <a:rPr lang="en-US" smtClean="0"/>
               <a:pPr/>
-              <a:t>8/8/2019</a:t>
+              <a:t>11/19/2019</a:t>
             </a:fld>
             <a:endParaRPr lang="en-US" dirty="0"/>
           </a:p>
@@ -1475,7 +1475,7 @@
             <a:fld id="{B61BEF0D-F0BB-DE4B-95CE-6DB70DBA9567}" type="datetimeFigureOut">
               <a:rPr lang="en-US" smtClean="0"/>
               <a:pPr/>
-              <a:t>8/8/2019</a:t>
+              <a:t>11/19/2019</a:t>
             </a:fld>
             <a:endParaRPr lang="en-US" dirty="0"/>
           </a:p>
@@ -1751,7 +1751,7 @@
             <a:fld id="{B61BEF0D-F0BB-DE4B-95CE-6DB70DBA9567}" type="datetimeFigureOut">
               <a:rPr lang="en-US" smtClean="0"/>
               <a:pPr/>
-              <a:t>8/8/2019</a:t>
+              <a:t>11/19/2019</a:t>
             </a:fld>
             <a:endParaRPr lang="en-US" dirty="0"/>
           </a:p>
@@ -2052,7 +2052,7 @@
           <a:p>
             <a:fld id="{EB712588-04B1-427B-82EE-E8DB90309F08}" type="datetimeFigureOut">
               <a:rPr lang="en-US" smtClean="0"/>
-              <a:t>8/8/2019</a:t>
+              <a:t>11/19/2019</a:t>
             </a:fld>
             <a:endParaRPr lang="en-US" dirty="0"/>
           </a:p>
@@ -2467,7 +2467,7 @@
             <a:fld id="{B61BEF0D-F0BB-DE4B-95CE-6DB70DBA9567}" type="datetimeFigureOut">
               <a:rPr lang="en-US" smtClean="0"/>
               <a:pPr/>
-              <a:t>8/8/2019</a:t>
+              <a:t>11/19/2019</a:t>
             </a:fld>
             <a:endParaRPr lang="en-US" dirty="0"/>
           </a:p>
@@ -2611,7 +2611,7 @@
             <a:fld id="{B61BEF0D-F0BB-DE4B-95CE-6DB70DBA9567}" type="datetimeFigureOut">
               <a:rPr lang="en-US" smtClean="0"/>
               <a:pPr/>
-              <a:t>8/8/2019</a:t>
+              <a:t>11/19/2019</a:t>
             </a:fld>
             <a:endParaRPr lang="en-US" dirty="0"/>
           </a:p>
@@ -2724,7 +2724,7 @@
           <a:p>
             <a:fld id="{CA2E3467-0D89-4ADB-A534-234A23CA62FE}" type="datetimeFigureOut">
               <a:rPr lang="en-US" smtClean="0"/>
-              <a:t>8/8/2019</a:t>
+              <a:t>11/19/2019</a:t>
             </a:fld>
             <a:endParaRPr lang="en-US"/>
           </a:p>
@@ -3035,7 +3035,7 @@
           <a:p>
             <a:fld id="{42A54C80-263E-416B-A8E0-580EDEADCBDC}" type="datetimeFigureOut">
               <a:rPr lang="en-US" smtClean="0"/>
-              <a:t>8/8/2019</a:t>
+              <a:t>11/19/2019</a:t>
             </a:fld>
             <a:endParaRPr lang="en-US" dirty="0"/>
           </a:p>
@@ -3326,7 +3326,7 @@
             <a:fld id="{B61BEF0D-F0BB-DE4B-95CE-6DB70DBA9567}" type="datetimeFigureOut">
               <a:rPr lang="en-US" smtClean="0"/>
               <a:pPr/>
-              <a:t>8/8/2019</a:t>
+              <a:t>11/19/2019</a:t>
             </a:fld>
             <a:endParaRPr lang="en-US" dirty="0"/>
           </a:p>
@@ -3570,7 +3570,7 @@
             <a:fld id="{B61BEF0D-F0BB-DE4B-95CE-6DB70DBA9567}" type="datetimeFigureOut">
               <a:rPr lang="en-US" smtClean="0"/>
               <a:pPr/>
-              <a:t>8/8/2019</a:t>
+              <a:t>11/19/2019</a:t>
             </a:fld>
             <a:endParaRPr lang="en-US" dirty="0"/>
           </a:p>
@@ -4444,12 +4444,20 @@
               <a:t>derived from assessment</a:t>
             </a:r>
             <a:br>
-              <a:rPr lang="en-US" b="1" dirty="0">
+              <a:rPr lang="en-US" b="1">
                 <a:solidFill>
                   <a:schemeClr val="bg1"/>
                 </a:solidFill>
               </a:rPr>
             </a:br>
+            <a:r>
+              <a:rPr lang="en-US" b="1">
+                <a:solidFill>
+                  <a:schemeClr val="bg1"/>
+                </a:solidFill>
+              </a:rPr>
+              <a:t>and </a:t>
+            </a:r>
             <a:r>
               <a:rPr lang="en-US" b="1" dirty="0">
                 <a:solidFill>

</xml_diff>